<commit_message>
pair rdd notebooklar gözden geçirildi
</commit_message>
<xml_diff>
--- a/12_Apache_Nifi/01_Apache_Nifi.pptx
+++ b/12_Apache_Nifi/01_Apache_Nifi.pptx
@@ -5,7 +5,7 @@
     <p:sldMasterId id="2147483648" r:id="rId1"/>
   </p:sldMasterIdLst>
   <p:notesMasterIdLst>
-    <p:notesMasterId r:id="rId26"/>
+    <p:notesMasterId r:id="rId24"/>
   </p:notesMasterIdLst>
   <p:sldIdLst>
     <p:sldId id="257" r:id="rId2"/>
@@ -30,8 +30,6 @@
     <p:sldId id="285" r:id="rId21"/>
     <p:sldId id="289" r:id="rId22"/>
     <p:sldId id="288" r:id="rId23"/>
-    <p:sldId id="286" r:id="rId24"/>
-    <p:sldId id="287" r:id="rId25"/>
   </p:sldIdLst>
   <p:sldSz cx="12192000" cy="6858000"/>
   <p:notesSz cx="6858000" cy="9144000"/>
@@ -1023,7 +1021,7 @@
           <a:p>
             <a:fld id="{6F77F576-AE14-466D-AA6B-335273622B21}" type="datetimeFigureOut">
               <a:rPr lang="en-US" smtClean="0"/>
-              <a:t>5/7/2019</a:t>
+              <a:t>10/31/2019</a:t>
             </a:fld>
             <a:endParaRPr lang="en-US"/>
           </a:p>
@@ -1422,7 +1420,7 @@
           <a:p>
             <a:fld id="{54AA066D-271F-4C1A-B89A-0705A7689EE9}" type="datetimeFigureOut">
               <a:rPr lang="en-US" smtClean="0"/>
-              <a:t>5/7/2019</a:t>
+              <a:t>10/31/2019</a:t>
             </a:fld>
             <a:endParaRPr lang="en-US"/>
           </a:p>
@@ -1592,7 +1590,7 @@
           <a:p>
             <a:fld id="{54AA066D-271F-4C1A-B89A-0705A7689EE9}" type="datetimeFigureOut">
               <a:rPr lang="en-US" smtClean="0"/>
-              <a:t>5/7/2019</a:t>
+              <a:t>10/31/2019</a:t>
             </a:fld>
             <a:endParaRPr lang="en-US"/>
           </a:p>
@@ -1772,7 +1770,7 @@
           <a:p>
             <a:fld id="{54AA066D-271F-4C1A-B89A-0705A7689EE9}" type="datetimeFigureOut">
               <a:rPr lang="en-US" smtClean="0"/>
-              <a:t>5/7/2019</a:t>
+              <a:t>10/31/2019</a:t>
             </a:fld>
             <a:endParaRPr lang="en-US"/>
           </a:p>
@@ -1942,7 +1940,7 @@
           <a:p>
             <a:fld id="{54AA066D-271F-4C1A-B89A-0705A7689EE9}" type="datetimeFigureOut">
               <a:rPr lang="en-US" smtClean="0"/>
-              <a:t>5/7/2019</a:t>
+              <a:t>10/31/2019</a:t>
             </a:fld>
             <a:endParaRPr lang="en-US"/>
           </a:p>
@@ -2188,7 +2186,7 @@
           <a:p>
             <a:fld id="{54AA066D-271F-4C1A-B89A-0705A7689EE9}" type="datetimeFigureOut">
               <a:rPr lang="en-US" smtClean="0"/>
-              <a:t>5/7/2019</a:t>
+              <a:t>10/31/2019</a:t>
             </a:fld>
             <a:endParaRPr lang="en-US"/>
           </a:p>
@@ -2420,7 +2418,7 @@
           <a:p>
             <a:fld id="{54AA066D-271F-4C1A-B89A-0705A7689EE9}" type="datetimeFigureOut">
               <a:rPr lang="en-US" smtClean="0"/>
-              <a:t>5/7/2019</a:t>
+              <a:t>10/31/2019</a:t>
             </a:fld>
             <a:endParaRPr lang="en-US"/>
           </a:p>
@@ -2787,7 +2785,7 @@
           <a:p>
             <a:fld id="{54AA066D-271F-4C1A-B89A-0705A7689EE9}" type="datetimeFigureOut">
               <a:rPr lang="en-US" smtClean="0"/>
-              <a:t>5/7/2019</a:t>
+              <a:t>10/31/2019</a:t>
             </a:fld>
             <a:endParaRPr lang="en-US"/>
           </a:p>
@@ -2905,7 +2903,7 @@
           <a:p>
             <a:fld id="{54AA066D-271F-4C1A-B89A-0705A7689EE9}" type="datetimeFigureOut">
               <a:rPr lang="en-US" smtClean="0"/>
-              <a:t>5/7/2019</a:t>
+              <a:t>10/31/2019</a:t>
             </a:fld>
             <a:endParaRPr lang="en-US"/>
           </a:p>
@@ -3000,7 +2998,7 @@
           <a:p>
             <a:fld id="{54AA066D-271F-4C1A-B89A-0705A7689EE9}" type="datetimeFigureOut">
               <a:rPr lang="en-US" smtClean="0"/>
-              <a:t>5/7/2019</a:t>
+              <a:t>10/31/2019</a:t>
             </a:fld>
             <a:endParaRPr lang="en-US"/>
           </a:p>
@@ -3277,7 +3275,7 @@
           <a:p>
             <a:fld id="{54AA066D-271F-4C1A-B89A-0705A7689EE9}" type="datetimeFigureOut">
               <a:rPr lang="en-US" smtClean="0"/>
-              <a:t>5/7/2019</a:t>
+              <a:t>10/31/2019</a:t>
             </a:fld>
             <a:endParaRPr lang="en-US"/>
           </a:p>
@@ -3530,7 +3528,7 @@
           <a:p>
             <a:fld id="{54AA066D-271F-4C1A-B89A-0705A7689EE9}" type="datetimeFigureOut">
               <a:rPr lang="en-US" smtClean="0"/>
-              <a:t>5/7/2019</a:t>
+              <a:t>10/31/2019</a:t>
             </a:fld>
             <a:endParaRPr lang="en-US"/>
           </a:p>
@@ -3743,7 +3741,7 @@
           <a:p>
             <a:fld id="{54AA066D-271F-4C1A-B89A-0705A7689EE9}" type="datetimeFigureOut">
               <a:rPr lang="en-US" smtClean="0"/>
-              <a:t>5/7/2019</a:t>
+              <a:t>10/31/2019</a:t>
             </a:fld>
             <a:endParaRPr lang="en-US"/>
           </a:p>
@@ -4285,7 +4283,7 @@
           <p:nvPr/>
         </p:nvPicPr>
         <p:blipFill>
-          <a:blip r:embed="rId3">
+          <a:blip r:embed="rId3" cstate="print">
             <a:extLst>
               <a:ext uri="{28A0092B-C50C-407E-A947-70E740481C1C}">
                 <a14:useLocalDpi xmlns:a14="http://schemas.microsoft.com/office/drawing/2010/main" val="0"/>
@@ -4759,7 +4757,7 @@
           <p:nvPr/>
         </p:nvPicPr>
         <p:blipFill>
-          <a:blip r:embed="rId2">
+          <a:blip r:embed="rId2" cstate="print">
             <a:extLst>
               <a:ext uri="{28A0092B-C50C-407E-A947-70E740481C1C}">
                 <a14:useLocalDpi xmlns:a14="http://schemas.microsoft.com/office/drawing/2010/main" val="0"/>
@@ -5299,7 +5297,7 @@
           <p:nvPr/>
         </p:nvPicPr>
         <p:blipFill>
-          <a:blip r:embed="rId2">
+          <a:blip r:embed="rId2" cstate="print">
             <a:extLst>
               <a:ext uri="{28A0092B-C50C-407E-A947-70E740481C1C}">
                 <a14:useLocalDpi xmlns:a14="http://schemas.microsoft.com/office/drawing/2010/main" val="0"/>
@@ -5812,7 +5810,7 @@
           <p:nvPr/>
         </p:nvPicPr>
         <p:blipFill>
-          <a:blip r:embed="rId2">
+          <a:blip r:embed="rId2" cstate="print">
             <a:extLst>
               <a:ext uri="{28A0092B-C50C-407E-A947-70E740481C1C}">
                 <a14:useLocalDpi xmlns:a14="http://schemas.microsoft.com/office/drawing/2010/main" val="0"/>
@@ -6017,7 +6015,7 @@
           <p:nvPr/>
         </p:nvPicPr>
         <p:blipFill>
-          <a:blip r:embed="rId3">
+          <a:blip r:embed="rId3" cstate="print">
             <a:extLst>
               <a:ext uri="{28A0092B-C50C-407E-A947-70E740481C1C}">
                 <a14:useLocalDpi xmlns:a14="http://schemas.microsoft.com/office/drawing/2010/main" val="0"/>
@@ -6316,7 +6314,7 @@
           <p:nvPr/>
         </p:nvPicPr>
         <p:blipFill>
-          <a:blip r:embed="rId3">
+          <a:blip r:embed="rId3" cstate="print">
             <a:extLst>
               <a:ext uri="{28A0092B-C50C-407E-A947-70E740481C1C}">
                 <a14:useLocalDpi xmlns:a14="http://schemas.microsoft.com/office/drawing/2010/main" val="0"/>
@@ -7015,7 +7013,7 @@
           <p:nvPr/>
         </p:nvPicPr>
         <p:blipFill>
-          <a:blip r:embed="rId2">
+          <a:blip r:embed="rId2" cstate="print">
             <a:extLst>
               <a:ext uri="{28A0092B-C50C-407E-A947-70E740481C1C}">
                 <a14:useLocalDpi xmlns:a14="http://schemas.microsoft.com/office/drawing/2010/main" val="0"/>
@@ -7629,7 +7627,7 @@
           <p:nvPr/>
         </p:nvPicPr>
         <p:blipFill>
-          <a:blip r:embed="rId2">
+          <a:blip r:embed="rId2" cstate="print">
             <a:extLst>
               <a:ext uri="{28A0092B-C50C-407E-A947-70E740481C1C}">
                 <a14:useLocalDpi xmlns:a14="http://schemas.microsoft.com/office/drawing/2010/main" val="0"/>
@@ -7836,7 +7834,7 @@
           <p:nvPr/>
         </p:nvPicPr>
         <p:blipFill>
-          <a:blip r:embed="rId4">
+          <a:blip r:embed="rId4" cstate="print">
             <a:extLst>
               <a:ext uri="{28A0092B-C50C-407E-A947-70E740481C1C}">
                 <a14:useLocalDpi xmlns:a14="http://schemas.microsoft.com/office/drawing/2010/main" val="0"/>
@@ -8013,7 +8011,7 @@
           <p:nvPr/>
         </p:nvPicPr>
         <p:blipFill>
-          <a:blip r:embed="rId3">
+          <a:blip r:embed="rId3" cstate="print">
             <a:extLst>
               <a:ext uri="{28A0092B-C50C-407E-A947-70E740481C1C}">
                 <a14:useLocalDpi xmlns:a14="http://schemas.microsoft.com/office/drawing/2010/main" val="0"/>
@@ -8190,7 +8188,7 @@
           <p:nvPr/>
         </p:nvPicPr>
         <p:blipFill>
-          <a:blip r:embed="rId3">
+          <a:blip r:embed="rId3" cstate="print">
             <a:extLst>
               <a:ext uri="{28A0092B-C50C-407E-A947-70E740481C1C}">
                 <a14:useLocalDpi xmlns:a14="http://schemas.microsoft.com/office/drawing/2010/main" val="0"/>
@@ -17088,7 +17086,7 @@
           <p:nvPr/>
         </p:nvPicPr>
         <p:blipFill>
-          <a:blip r:embed="rId6">
+          <a:blip r:embed="rId6" cstate="print">
             <a:extLst>
               <a:ext uri="{28A0092B-C50C-407E-A947-70E740481C1C}">
                 <a14:useLocalDpi xmlns:a14="http://schemas.microsoft.com/office/drawing/2010/main" val="0"/>
@@ -22848,7 +22846,7 @@
           <p:nvPr/>
         </p:nvPicPr>
         <p:blipFill>
-          <a:blip r:embed="rId3">
+          <a:blip r:embed="rId3" cstate="print">
             <a:extLst>
               <a:ext uri="{28A0092B-C50C-407E-A947-70E740481C1C}">
                 <a14:useLocalDpi xmlns:a14="http://schemas.microsoft.com/office/drawing/2010/main" val="0"/>
@@ -23036,7 +23034,7 @@
           <p:nvPr/>
         </p:nvPicPr>
         <p:blipFill>
-          <a:blip r:embed="rId3">
+          <a:blip r:embed="rId3" cstate="print">
             <a:extLst>
               <a:ext uri="{28A0092B-C50C-407E-A947-70E740481C1C}">
                 <a14:useLocalDpi xmlns:a14="http://schemas.microsoft.com/office/drawing/2010/main" val="0"/>
@@ -24525,11 +24523,15 @@
             <a:graphicFrameLocks noGrp="1"/>
           </p:cNvGraphicFramePr>
           <p:nvPr>
-            <p:extLst/>
+            <p:extLst>
+              <p:ext uri="{D42A27DB-BD31-4B8C-83A1-F6EECF244321}">
+                <p14:modId xmlns:p14="http://schemas.microsoft.com/office/powerpoint/2010/main" val="2855472185"/>
+              </p:ext>
+            </p:extLst>
           </p:nvPr>
         </p:nvGraphicFramePr>
         <p:xfrm>
-          <a:off x="463583" y="2266085"/>
+          <a:off x="492158" y="2266085"/>
           <a:ext cx="2980549" cy="635410"/>
         </p:xfrm>
         <a:graphic>
@@ -24799,7 +24801,7 @@
           <p:nvPr/>
         </p:nvPicPr>
         <p:blipFill>
-          <a:blip r:embed="rId6">
+          <a:blip r:embed="rId6" cstate="print">
             <a:extLst>
               <a:ext uri="{28A0092B-C50C-407E-A947-70E740481C1C}">
                 <a14:useLocalDpi xmlns:a14="http://schemas.microsoft.com/office/drawing/2010/main" val="0"/>
@@ -25331,7 +25333,7 @@
                                     <p:cond delay="0"/>
                                   </p:stCondLst>
                                   <p:childTnLst>
-                                    <p:animMotion origin="layout" path="M -5E-6 3.7037E-7 L 0.35091 0.0125 L 0.67578 -0.00255 L 0.68893 0.26273 " pathEditMode="relative" ptsTypes="AAAA">
+                                    <p:animMotion origin="layout" path="M -2.08333E-7 -3.7037E-7 L 0.35091 0.0125 L 0.67578 -0.00255 L 0.68893 0.26273 " pathEditMode="relative" rAng="0" ptsTypes="AAAA">
                                       <p:cBhvr>
                                         <p:cTn id="48" dur="2000" fill="hold"/>
                                         <p:tgtEl>
@@ -25342,6 +25344,7 @@
                                           <p:attrName>ppt_y</p:attrName>
                                         </p:attrNameLst>
                                       </p:cBhvr>
+                                      <p:rCtr x="34440" y="13009"/>
                                     </p:animMotion>
                                   </p:childTnLst>
                                 </p:cTn>
@@ -25430,1650 +25433,6 @@
       <p:bldP spid="23" grpId="0"/>
     </p:bldLst>
   </p:timing>
-</p:sld>
-</file>
-
-<file path=ppt/slides/slide23.xml><?xml version="1.0" encoding="utf-8"?>
-<p:sld xmlns:a="http://schemas.openxmlformats.org/drawingml/2006/main" xmlns:r="http://schemas.openxmlformats.org/officeDocument/2006/relationships" xmlns:p="http://schemas.openxmlformats.org/presentationml/2006/main">
-  <p:cSld>
-    <p:spTree>
-      <p:nvGrpSpPr>
-        <p:cNvPr id="1" name=""/>
-        <p:cNvGrpSpPr/>
-        <p:nvPr/>
-      </p:nvGrpSpPr>
-      <p:grpSpPr>
-        <a:xfrm>
-          <a:off x="0" y="0"/>
-          <a:ext cx="0" cy="0"/>
-          <a:chOff x="0" y="0"/>
-          <a:chExt cx="0" cy="0"/>
-        </a:xfrm>
-      </p:grpSpPr>
-      <p:cxnSp>
-        <p:nvCxnSpPr>
-          <p:cNvPr id="10" name="Düz Bağlayıcı 9"/>
-          <p:cNvCxnSpPr/>
-          <p:nvPr/>
-        </p:nvCxnSpPr>
-        <p:spPr>
-          <a:xfrm>
-            <a:off x="228596" y="6166763"/>
-            <a:ext cx="11768671" cy="0"/>
-          </a:xfrm>
-          <a:prstGeom prst="line">
-            <a:avLst/>
-          </a:prstGeom>
-          <a:ln w="101600" cmpd="thickThin">
-            <a:solidFill>
-              <a:schemeClr val="accent1">
-                <a:lumMod val="75000"/>
-              </a:schemeClr>
-            </a:solidFill>
-          </a:ln>
-        </p:spPr>
-        <p:style>
-          <a:lnRef idx="1">
-            <a:schemeClr val="accent1"/>
-          </a:lnRef>
-          <a:fillRef idx="0">
-            <a:schemeClr val="accent1"/>
-          </a:fillRef>
-          <a:effectRef idx="0">
-            <a:schemeClr val="accent1"/>
-          </a:effectRef>
-          <a:fontRef idx="minor">
-            <a:schemeClr val="tx1"/>
-          </a:fontRef>
-        </p:style>
-      </p:cxnSp>
-      <p:sp>
-        <p:nvSpPr>
-          <p:cNvPr id="16" name="Unvan 1"/>
-          <p:cNvSpPr>
-            <a:spLocks noGrp="1"/>
-          </p:cNvSpPr>
-          <p:nvPr>
-            <p:ph type="ctrTitle"/>
-          </p:nvPr>
-        </p:nvSpPr>
-        <p:spPr>
-          <a:xfrm>
-            <a:off x="1421176" y="325820"/>
-            <a:ext cx="9232135" cy="533101"/>
-          </a:xfrm>
-        </p:spPr>
-        <p:txBody>
-          <a:bodyPr>
-            <a:noAutofit/>
-          </a:bodyPr>
-          <a:lstStyle/>
-          <a:p>
-            <a:r>
-              <a:rPr lang="tr-TR" sz="2800" b="1" dirty="0">
-                <a:solidFill>
-                  <a:srgbClr val="CD1F26"/>
-                </a:solidFill>
-                <a:latin typeface="Arial" panose="020B0604020202020204" pitchFamily="34" charset="0"/>
-                <a:ea typeface="Verdana" panose="020B0604030504040204" pitchFamily="34" charset="0"/>
-                <a:cs typeface="Arial" panose="020B0604020202020204" pitchFamily="34" charset="0"/>
-              </a:rPr>
-              <a:t>NiFi Kurulum</a:t>
-            </a:r>
-            <a:endParaRPr lang="en-US" sz="2800" b="1" dirty="0">
-              <a:solidFill>
-                <a:srgbClr val="CD1F26"/>
-              </a:solidFill>
-              <a:latin typeface="Arial" panose="020B0604020202020204" pitchFamily="34" charset="0"/>
-              <a:ea typeface="Verdana" panose="020B0604030504040204" pitchFamily="34" charset="0"/>
-              <a:cs typeface="Arial" panose="020B0604020202020204" pitchFamily="34" charset="0"/>
-            </a:endParaRPr>
-          </a:p>
-        </p:txBody>
-      </p:sp>
-      <p:sp>
-        <p:nvSpPr>
-          <p:cNvPr id="19" name="İçerik Yer Tutucusu 2"/>
-          <p:cNvSpPr txBox="1">
-            <a:spLocks/>
-          </p:cNvSpPr>
-          <p:nvPr/>
-        </p:nvSpPr>
-        <p:spPr>
-          <a:xfrm>
-            <a:off x="1577667" y="1011122"/>
-            <a:ext cx="9070528" cy="4167487"/>
-          </a:xfrm>
-          <a:prstGeom prst="rect">
-            <a:avLst/>
-          </a:prstGeom>
-        </p:spPr>
-        <p:txBody>
-          <a:bodyPr vert="horz" lIns="91440" tIns="45720" rIns="91440" bIns="45720" rtlCol="0">
-            <a:normAutofit fontScale="92500" lnSpcReduction="20000"/>
-          </a:bodyPr>
-          <a:lstStyle>
-            <a:lvl1pPr marL="0" indent="0" algn="ctr" defTabSz="914400" rtl="0" eaLnBrk="1" latinLnBrk="0" hangingPunct="1">
-              <a:lnSpc>
-                <a:spcPct val="90000"/>
-              </a:lnSpc>
-              <a:spcBef>
-                <a:spcPts val="1000"/>
-              </a:spcBef>
-              <a:buFont typeface="Arial" panose="020B0604020202020204" pitchFamily="34" charset="0"/>
-              <a:buNone/>
-              <a:defRPr sz="2400" kern="1200">
-                <a:solidFill>
-                  <a:schemeClr val="tx1"/>
-                </a:solidFill>
-                <a:latin typeface="+mn-lt"/>
-                <a:ea typeface="+mn-ea"/>
-                <a:cs typeface="+mn-cs"/>
-              </a:defRPr>
-            </a:lvl1pPr>
-            <a:lvl2pPr marL="457200" indent="0" algn="ctr" defTabSz="914400" rtl="0" eaLnBrk="1" latinLnBrk="0" hangingPunct="1">
-              <a:lnSpc>
-                <a:spcPct val="90000"/>
-              </a:lnSpc>
-              <a:spcBef>
-                <a:spcPts val="500"/>
-              </a:spcBef>
-              <a:buFont typeface="Arial" panose="020B0604020202020204" pitchFamily="34" charset="0"/>
-              <a:buNone/>
-              <a:defRPr sz="2000" kern="1200">
-                <a:solidFill>
-                  <a:schemeClr val="tx1"/>
-                </a:solidFill>
-                <a:latin typeface="+mn-lt"/>
-                <a:ea typeface="+mn-ea"/>
-                <a:cs typeface="+mn-cs"/>
-              </a:defRPr>
-            </a:lvl2pPr>
-            <a:lvl3pPr marL="914400" indent="0" algn="ctr" defTabSz="914400" rtl="0" eaLnBrk="1" latinLnBrk="0" hangingPunct="1">
-              <a:lnSpc>
-                <a:spcPct val="90000"/>
-              </a:lnSpc>
-              <a:spcBef>
-                <a:spcPts val="500"/>
-              </a:spcBef>
-              <a:buFont typeface="Arial" panose="020B0604020202020204" pitchFamily="34" charset="0"/>
-              <a:buNone/>
-              <a:defRPr sz="1800" kern="1200">
-                <a:solidFill>
-                  <a:schemeClr val="tx1"/>
-                </a:solidFill>
-                <a:latin typeface="+mn-lt"/>
-                <a:ea typeface="+mn-ea"/>
-                <a:cs typeface="+mn-cs"/>
-              </a:defRPr>
-            </a:lvl3pPr>
-            <a:lvl4pPr marL="1371600" indent="0" algn="ctr" defTabSz="914400" rtl="0" eaLnBrk="1" latinLnBrk="0" hangingPunct="1">
-              <a:lnSpc>
-                <a:spcPct val="90000"/>
-              </a:lnSpc>
-              <a:spcBef>
-                <a:spcPts val="500"/>
-              </a:spcBef>
-              <a:buFont typeface="Arial" panose="020B0604020202020204" pitchFamily="34" charset="0"/>
-              <a:buNone/>
-              <a:defRPr sz="1600" kern="1200">
-                <a:solidFill>
-                  <a:schemeClr val="tx1"/>
-                </a:solidFill>
-                <a:latin typeface="+mn-lt"/>
-                <a:ea typeface="+mn-ea"/>
-                <a:cs typeface="+mn-cs"/>
-              </a:defRPr>
-            </a:lvl4pPr>
-            <a:lvl5pPr marL="1828800" indent="0" algn="ctr" defTabSz="914400" rtl="0" eaLnBrk="1" latinLnBrk="0" hangingPunct="1">
-              <a:lnSpc>
-                <a:spcPct val="90000"/>
-              </a:lnSpc>
-              <a:spcBef>
-                <a:spcPts val="500"/>
-              </a:spcBef>
-              <a:buFont typeface="Arial" panose="020B0604020202020204" pitchFamily="34" charset="0"/>
-              <a:buNone/>
-              <a:defRPr sz="1600" kern="1200">
-                <a:solidFill>
-                  <a:schemeClr val="tx1"/>
-                </a:solidFill>
-                <a:latin typeface="+mn-lt"/>
-                <a:ea typeface="+mn-ea"/>
-                <a:cs typeface="+mn-cs"/>
-              </a:defRPr>
-            </a:lvl5pPr>
-            <a:lvl6pPr marL="2286000" indent="0" algn="ctr" defTabSz="914400" rtl="0" eaLnBrk="1" latinLnBrk="0" hangingPunct="1">
-              <a:lnSpc>
-                <a:spcPct val="90000"/>
-              </a:lnSpc>
-              <a:spcBef>
-                <a:spcPts val="500"/>
-              </a:spcBef>
-              <a:buFont typeface="Arial" panose="020B0604020202020204" pitchFamily="34" charset="0"/>
-              <a:buNone/>
-              <a:defRPr sz="1600" kern="1200">
-                <a:solidFill>
-                  <a:schemeClr val="tx1"/>
-                </a:solidFill>
-                <a:latin typeface="+mn-lt"/>
-                <a:ea typeface="+mn-ea"/>
-                <a:cs typeface="+mn-cs"/>
-              </a:defRPr>
-            </a:lvl6pPr>
-            <a:lvl7pPr marL="2743200" indent="0" algn="ctr" defTabSz="914400" rtl="0" eaLnBrk="1" latinLnBrk="0" hangingPunct="1">
-              <a:lnSpc>
-                <a:spcPct val="90000"/>
-              </a:lnSpc>
-              <a:spcBef>
-                <a:spcPts val="500"/>
-              </a:spcBef>
-              <a:buFont typeface="Arial" panose="020B0604020202020204" pitchFamily="34" charset="0"/>
-              <a:buNone/>
-              <a:defRPr sz="1600" kern="1200">
-                <a:solidFill>
-                  <a:schemeClr val="tx1"/>
-                </a:solidFill>
-                <a:latin typeface="+mn-lt"/>
-                <a:ea typeface="+mn-ea"/>
-                <a:cs typeface="+mn-cs"/>
-              </a:defRPr>
-            </a:lvl7pPr>
-            <a:lvl8pPr marL="3200400" indent="0" algn="ctr" defTabSz="914400" rtl="0" eaLnBrk="1" latinLnBrk="0" hangingPunct="1">
-              <a:lnSpc>
-                <a:spcPct val="90000"/>
-              </a:lnSpc>
-              <a:spcBef>
-                <a:spcPts val="500"/>
-              </a:spcBef>
-              <a:buFont typeface="Arial" panose="020B0604020202020204" pitchFamily="34" charset="0"/>
-              <a:buNone/>
-              <a:defRPr sz="1600" kern="1200">
-                <a:solidFill>
-                  <a:schemeClr val="tx1"/>
-                </a:solidFill>
-                <a:latin typeface="+mn-lt"/>
-                <a:ea typeface="+mn-ea"/>
-                <a:cs typeface="+mn-cs"/>
-              </a:defRPr>
-            </a:lvl8pPr>
-            <a:lvl9pPr marL="3657600" indent="0" algn="ctr" defTabSz="914400" rtl="0" eaLnBrk="1" latinLnBrk="0" hangingPunct="1">
-              <a:lnSpc>
-                <a:spcPct val="90000"/>
-              </a:lnSpc>
-              <a:spcBef>
-                <a:spcPts val="500"/>
-              </a:spcBef>
-              <a:buFont typeface="Arial" panose="020B0604020202020204" pitchFamily="34" charset="0"/>
-              <a:buNone/>
-              <a:defRPr sz="1600" kern="1200">
-                <a:solidFill>
-                  <a:schemeClr val="tx1"/>
-                </a:solidFill>
-                <a:latin typeface="+mn-lt"/>
-                <a:ea typeface="+mn-ea"/>
-                <a:cs typeface="+mn-cs"/>
-              </a:defRPr>
-            </a:lvl9pPr>
-          </a:lstStyle>
-          <a:p>
-            <a:pPr marL="457200" indent="-457200" algn="l">
-              <a:lnSpc>
-                <a:spcPct val="150000"/>
-              </a:lnSpc>
-              <a:buFont typeface="+mj-lt"/>
-              <a:buAutoNum type="arabicPeriod"/>
-            </a:pPr>
-            <a:r>
-              <a:rPr lang="tr-TR" dirty="0" err="1">
-                <a:latin typeface="Roboto"/>
-              </a:rPr>
-              <a:t>nifi</a:t>
-            </a:r>
-            <a:r>
-              <a:rPr lang="tr-TR" dirty="0">
-                <a:latin typeface="Roboto"/>
-              </a:rPr>
-              <a:t> repo dosyasını </a:t>
-            </a:r>
-            <a:r>
-              <a:rPr lang="tr-TR" dirty="0">
-                <a:latin typeface="Consolas" panose="020B0609020204030204" pitchFamily="49" charset="0"/>
-              </a:rPr>
-              <a:t>/</a:t>
-            </a:r>
-            <a:r>
-              <a:rPr lang="tr-TR" dirty="0" err="1">
-                <a:latin typeface="Consolas" panose="020B0609020204030204" pitchFamily="49" charset="0"/>
-              </a:rPr>
-              <a:t>etc</a:t>
-            </a:r>
-            <a:r>
-              <a:rPr lang="tr-TR" dirty="0">
-                <a:latin typeface="Consolas" panose="020B0609020204030204" pitchFamily="49" charset="0"/>
-              </a:rPr>
-              <a:t>/</a:t>
-            </a:r>
-            <a:r>
-              <a:rPr lang="tr-TR" dirty="0" err="1">
-                <a:latin typeface="Consolas" panose="020B0609020204030204" pitchFamily="49" charset="0"/>
-              </a:rPr>
-              <a:t>yum.repos.d</a:t>
-            </a:r>
-            <a:r>
-              <a:rPr lang="tr-TR" dirty="0">
-                <a:latin typeface="Consolas" panose="020B0609020204030204" pitchFamily="49" charset="0"/>
-              </a:rPr>
-              <a:t>/ </a:t>
-            </a:r>
-            <a:r>
-              <a:rPr lang="tr-TR" dirty="0" err="1">
-                <a:latin typeface="Roboto"/>
-              </a:rPr>
-              <a:t>diznine</a:t>
-            </a:r>
-            <a:r>
-              <a:rPr lang="tr-TR" dirty="0">
-                <a:latin typeface="Roboto"/>
-              </a:rPr>
-              <a:t> indir.</a:t>
-            </a:r>
-          </a:p>
-          <a:p>
-            <a:pPr lvl="1" algn="l">
-              <a:lnSpc>
-                <a:spcPct val="150000"/>
-              </a:lnSpc>
-            </a:pPr>
-            <a:r>
-              <a:rPr lang="tr-TR" sz="1500" dirty="0" err="1">
-                <a:latin typeface="Consolas" panose="020B0609020204030204" pitchFamily="49" charset="0"/>
-              </a:rPr>
-              <a:t>wget</a:t>
-            </a:r>
-            <a:r>
-              <a:rPr lang="tr-TR" sz="1500" dirty="0">
-                <a:latin typeface="Consolas" panose="020B0609020204030204" pitchFamily="49" charset="0"/>
-              </a:rPr>
-              <a:t> </a:t>
-            </a:r>
-            <a:r>
-              <a:rPr lang="tr-TR" sz="1500" dirty="0">
-                <a:latin typeface="Consolas" panose="020B0609020204030204" pitchFamily="49" charset="0"/>
-                <a:hlinkClick r:id="rId2"/>
-              </a:rPr>
-              <a:t>http://public-repo</a:t>
-            </a:r>
-            <a:r>
-              <a:rPr lang="tr-TR" sz="1500" dirty="0">
-                <a:latin typeface="Consolas" panose="020B0609020204030204" pitchFamily="49" charset="0"/>
-              </a:rPr>
-              <a:t>hortonworks.com/HDF/centos6/3.x/updates/3.1.2.0/hdf.repo</a:t>
-            </a:r>
-          </a:p>
-          <a:p>
-            <a:pPr marL="457200" indent="-457200" algn="l">
-              <a:lnSpc>
-                <a:spcPct val="150000"/>
-              </a:lnSpc>
-              <a:buFont typeface="+mj-lt"/>
-              <a:buAutoNum type="arabicPeriod"/>
-            </a:pPr>
-            <a:r>
-              <a:rPr lang="tr-TR" dirty="0">
-                <a:latin typeface="Consolas" panose="020B0609020204030204" pitchFamily="49" charset="0"/>
-              </a:rPr>
-              <a:t>yum </a:t>
-            </a:r>
-            <a:r>
-              <a:rPr lang="tr-TR" dirty="0" err="1">
-                <a:latin typeface="Consolas" panose="020B0609020204030204" pitchFamily="49" charset="0"/>
-              </a:rPr>
-              <a:t>info</a:t>
-            </a:r>
-            <a:r>
-              <a:rPr lang="tr-TR" dirty="0">
-                <a:latin typeface="Consolas" panose="020B0609020204030204" pitchFamily="49" charset="0"/>
-              </a:rPr>
-              <a:t> </a:t>
-            </a:r>
-            <a:r>
-              <a:rPr lang="tr-TR" dirty="0" err="1">
-                <a:latin typeface="Consolas" panose="020B0609020204030204" pitchFamily="49" charset="0"/>
-              </a:rPr>
-              <a:t>nifi</a:t>
-            </a:r>
-            <a:r>
-              <a:rPr lang="tr-TR" dirty="0">
-                <a:latin typeface="Consolas" panose="020B0609020204030204" pitchFamily="49" charset="0"/>
-              </a:rPr>
-              <a:t>*</a:t>
-            </a:r>
-            <a:r>
-              <a:rPr lang="tr-TR" dirty="0">
-                <a:latin typeface="Roboto"/>
-              </a:rPr>
-              <a:t> komutuyla paket kontrolü yap.</a:t>
-            </a:r>
-          </a:p>
-          <a:p>
-            <a:pPr marL="457200" indent="-457200" algn="l">
-              <a:lnSpc>
-                <a:spcPct val="150000"/>
-              </a:lnSpc>
-              <a:buFont typeface="+mj-lt"/>
-              <a:buAutoNum type="arabicPeriod"/>
-            </a:pPr>
-            <a:r>
-              <a:rPr lang="tr-TR" dirty="0">
-                <a:latin typeface="Consolas" panose="020B0609020204030204" pitchFamily="49" charset="0"/>
-              </a:rPr>
-              <a:t>yum -y </a:t>
-            </a:r>
-            <a:r>
-              <a:rPr lang="tr-TR" dirty="0" err="1">
-                <a:latin typeface="Consolas" panose="020B0609020204030204" pitchFamily="49" charset="0"/>
-              </a:rPr>
-              <a:t>install</a:t>
-            </a:r>
-            <a:r>
-              <a:rPr lang="tr-TR" dirty="0">
-                <a:latin typeface="Consolas" panose="020B0609020204030204" pitchFamily="49" charset="0"/>
-              </a:rPr>
-              <a:t>  nifi_3_1_2_0_7 </a:t>
-            </a:r>
-            <a:r>
-              <a:rPr lang="tr-TR" dirty="0">
-                <a:latin typeface="Roboto"/>
-              </a:rPr>
-              <a:t>komutu ile kurulumu başlat.</a:t>
-            </a:r>
-          </a:p>
-          <a:p>
-            <a:pPr marL="457200" indent="-457200" algn="l">
-              <a:lnSpc>
-                <a:spcPct val="150000"/>
-              </a:lnSpc>
-              <a:buFont typeface="+mj-lt"/>
-              <a:buAutoNum type="arabicPeriod"/>
-            </a:pPr>
-            <a:r>
-              <a:rPr lang="tr-TR" sz="1900" dirty="0">
-                <a:latin typeface="Consolas" panose="020B0609020204030204" pitchFamily="49" charset="0"/>
-              </a:rPr>
-              <a:t>vi /</a:t>
-            </a:r>
-            <a:r>
-              <a:rPr lang="tr-TR" sz="1900" dirty="0" err="1">
-                <a:latin typeface="Consolas" panose="020B0609020204030204" pitchFamily="49" charset="0"/>
-              </a:rPr>
-              <a:t>usr</a:t>
-            </a:r>
-            <a:r>
-              <a:rPr lang="tr-TR" sz="1900" dirty="0">
-                <a:latin typeface="Consolas" panose="020B0609020204030204" pitchFamily="49" charset="0"/>
-              </a:rPr>
-              <a:t>/</a:t>
-            </a:r>
-            <a:r>
-              <a:rPr lang="tr-TR" sz="1900" dirty="0" err="1">
-                <a:latin typeface="Consolas" panose="020B0609020204030204" pitchFamily="49" charset="0"/>
-              </a:rPr>
-              <a:t>hdf</a:t>
-            </a:r>
-            <a:r>
-              <a:rPr lang="tr-TR" sz="1900" dirty="0">
-                <a:latin typeface="Consolas" panose="020B0609020204030204" pitchFamily="49" charset="0"/>
-              </a:rPr>
-              <a:t>/</a:t>
-            </a:r>
-            <a:r>
-              <a:rPr lang="tr-TR" sz="1900" dirty="0" err="1">
-                <a:latin typeface="Consolas" panose="020B0609020204030204" pitchFamily="49" charset="0"/>
-              </a:rPr>
-              <a:t>current</a:t>
-            </a:r>
-            <a:r>
-              <a:rPr lang="tr-TR" sz="1900" dirty="0">
-                <a:latin typeface="Consolas" panose="020B0609020204030204" pitchFamily="49" charset="0"/>
-              </a:rPr>
-              <a:t>/</a:t>
-            </a:r>
-            <a:r>
-              <a:rPr lang="tr-TR" sz="1900" dirty="0" err="1">
-                <a:latin typeface="Consolas" panose="020B0609020204030204" pitchFamily="49" charset="0"/>
-              </a:rPr>
-              <a:t>nifi</a:t>
-            </a:r>
-            <a:r>
-              <a:rPr lang="tr-TR" sz="1900" dirty="0">
-                <a:latin typeface="Consolas" panose="020B0609020204030204" pitchFamily="49" charset="0"/>
-              </a:rPr>
-              <a:t>/</a:t>
-            </a:r>
-            <a:r>
-              <a:rPr lang="tr-TR" sz="1900" dirty="0" err="1">
-                <a:latin typeface="Consolas" panose="020B0609020204030204" pitchFamily="49" charset="0"/>
-              </a:rPr>
-              <a:t>conf</a:t>
-            </a:r>
-            <a:r>
-              <a:rPr lang="tr-TR" sz="1900" dirty="0">
-                <a:latin typeface="Consolas" panose="020B0609020204030204" pitchFamily="49" charset="0"/>
-              </a:rPr>
-              <a:t>/</a:t>
-            </a:r>
-            <a:r>
-              <a:rPr lang="tr-TR" sz="1900" dirty="0" err="1">
-                <a:latin typeface="Consolas" panose="020B0609020204030204" pitchFamily="49" charset="0"/>
-              </a:rPr>
-              <a:t>nifi.properties</a:t>
-            </a:r>
-            <a:r>
-              <a:rPr lang="tr-TR" dirty="0">
-                <a:latin typeface="Roboto"/>
-              </a:rPr>
-              <a:t> ile dosya içine gir.</a:t>
-            </a:r>
-          </a:p>
-          <a:p>
-            <a:pPr lvl="1" algn="l">
-              <a:lnSpc>
-                <a:spcPct val="150000"/>
-              </a:lnSpc>
-            </a:pPr>
-            <a:r>
-              <a:rPr lang="tr-TR" dirty="0" err="1">
-                <a:latin typeface="Consolas" panose="020B0609020204030204" pitchFamily="49" charset="0"/>
-              </a:rPr>
-              <a:t>nifi.web.http.port</a:t>
-            </a:r>
-            <a:r>
-              <a:rPr lang="tr-TR" dirty="0">
-                <a:latin typeface="Consolas" panose="020B0609020204030204" pitchFamily="49" charset="0"/>
-              </a:rPr>
-              <a:t>=</a:t>
-            </a:r>
-            <a:r>
-              <a:rPr lang="tr-TR" dirty="0">
-                <a:latin typeface="Roboto"/>
-              </a:rPr>
-              <a:t> değerini 8080'den 8090'a çek.</a:t>
-            </a:r>
-          </a:p>
-          <a:p>
-            <a:pPr marL="457200" indent="-457200" algn="l">
-              <a:lnSpc>
-                <a:spcPct val="150000"/>
-              </a:lnSpc>
-              <a:buFont typeface="+mj-lt"/>
-              <a:buAutoNum type="arabicPeriod"/>
-            </a:pPr>
-            <a:r>
-              <a:rPr lang="tr-TR" dirty="0" err="1">
-                <a:latin typeface="Roboto"/>
-              </a:rPr>
-              <a:t>Browser’a</a:t>
-            </a:r>
-            <a:r>
-              <a:rPr lang="tr-TR" dirty="0">
-                <a:latin typeface="Roboto"/>
-              </a:rPr>
-              <a:t> </a:t>
-            </a:r>
-            <a:r>
-              <a:rPr lang="tr-TR" sz="1900" dirty="0">
-                <a:solidFill>
-                  <a:srgbClr val="0070C0"/>
-                </a:solidFill>
-                <a:latin typeface="Consolas" panose="020B0609020204030204" pitchFamily="49" charset="0"/>
-              </a:rPr>
-              <a:t>http://sandbox.hortonworks.com:8090/nifi/ </a:t>
-            </a:r>
-            <a:r>
-              <a:rPr lang="tr-TR" dirty="0">
-                <a:latin typeface="Roboto"/>
-              </a:rPr>
-              <a:t>adresini gir ve NiFi </a:t>
-            </a:r>
-            <a:r>
-              <a:rPr lang="tr-TR" dirty="0" err="1">
-                <a:latin typeface="Roboto"/>
-              </a:rPr>
-              <a:t>arayüzünü</a:t>
-            </a:r>
-            <a:r>
-              <a:rPr lang="tr-TR" dirty="0">
-                <a:latin typeface="Roboto"/>
-              </a:rPr>
-              <a:t> gör. </a:t>
-            </a:r>
-            <a:endParaRPr lang="en-US" dirty="0">
-              <a:latin typeface="Roboto"/>
-            </a:endParaRPr>
-          </a:p>
-        </p:txBody>
-      </p:sp>
-      <p:pic>
-        <p:nvPicPr>
-          <p:cNvPr id="17" name="Resim 16">
-            <a:extLst>
-              <a:ext uri="{FF2B5EF4-FFF2-40B4-BE49-F238E27FC236}">
-                <a16:creationId xmlns:a16="http://schemas.microsoft.com/office/drawing/2014/main" id="{9C3AB74E-95E6-46DF-AF12-569CA34CE938}"/>
-              </a:ext>
-            </a:extLst>
-          </p:cNvPr>
-          <p:cNvPicPr>
-            <a:picLocks noChangeAspect="1"/>
-          </p:cNvPicPr>
-          <p:nvPr/>
-        </p:nvPicPr>
-        <p:blipFill>
-          <a:blip r:embed="rId3">
-            <a:extLst>
-              <a:ext uri="{28A0092B-C50C-407E-A947-70E740481C1C}">
-                <a14:useLocalDpi xmlns:a14="http://schemas.microsoft.com/office/drawing/2010/main" val="0"/>
-              </a:ext>
-            </a:extLst>
-          </a:blip>
-          <a:stretch>
-            <a:fillRect/>
-          </a:stretch>
-        </p:blipFill>
-        <p:spPr>
-          <a:xfrm>
-            <a:off x="340622" y="6362072"/>
-            <a:ext cx="2154700" cy="308365"/>
-          </a:xfrm>
-          <a:prstGeom prst="rect">
-            <a:avLst/>
-          </a:prstGeom>
-        </p:spPr>
-      </p:pic>
-    </p:spTree>
-    <p:extLst>
-      <p:ext uri="{BB962C8B-B14F-4D97-AF65-F5344CB8AC3E}">
-        <p14:creationId xmlns:p14="http://schemas.microsoft.com/office/powerpoint/2010/main" val="20570779"/>
-      </p:ext>
-    </p:extLst>
-  </p:cSld>
-  <p:clrMapOvr>
-    <a:masterClrMapping/>
-  </p:clrMapOvr>
-</p:sld>
-</file>
-
-<file path=ppt/slides/slide24.xml><?xml version="1.0" encoding="utf-8"?>
-<p:sld xmlns:a="http://schemas.openxmlformats.org/drawingml/2006/main" xmlns:r="http://schemas.openxmlformats.org/officeDocument/2006/relationships" xmlns:p="http://schemas.openxmlformats.org/presentationml/2006/main">
-  <p:cSld>
-    <p:spTree>
-      <p:nvGrpSpPr>
-        <p:cNvPr id="1" name=""/>
-        <p:cNvGrpSpPr/>
-        <p:nvPr/>
-      </p:nvGrpSpPr>
-      <p:grpSpPr>
-        <a:xfrm>
-          <a:off x="0" y="0"/>
-          <a:ext cx="0" cy="0"/>
-          <a:chOff x="0" y="0"/>
-          <a:chExt cx="0" cy="0"/>
-        </a:xfrm>
-      </p:grpSpPr>
-      <p:cxnSp>
-        <p:nvCxnSpPr>
-          <p:cNvPr id="10" name="Düz Bağlayıcı 9"/>
-          <p:cNvCxnSpPr/>
-          <p:nvPr/>
-        </p:nvCxnSpPr>
-        <p:spPr>
-          <a:xfrm>
-            <a:off x="228596" y="6166763"/>
-            <a:ext cx="11768671" cy="0"/>
-          </a:xfrm>
-          <a:prstGeom prst="line">
-            <a:avLst/>
-          </a:prstGeom>
-          <a:ln w="101600" cmpd="thickThin">
-            <a:solidFill>
-              <a:schemeClr val="accent1">
-                <a:lumMod val="75000"/>
-              </a:schemeClr>
-            </a:solidFill>
-          </a:ln>
-        </p:spPr>
-        <p:style>
-          <a:lnRef idx="1">
-            <a:schemeClr val="accent1"/>
-          </a:lnRef>
-          <a:fillRef idx="0">
-            <a:schemeClr val="accent1"/>
-          </a:fillRef>
-          <a:effectRef idx="0">
-            <a:schemeClr val="accent1"/>
-          </a:effectRef>
-          <a:fontRef idx="minor">
-            <a:schemeClr val="tx1"/>
-          </a:fontRef>
-        </p:style>
-      </p:cxnSp>
-      <p:sp>
-        <p:nvSpPr>
-          <p:cNvPr id="16" name="Unvan 1"/>
-          <p:cNvSpPr>
-            <a:spLocks noGrp="1"/>
-          </p:cNvSpPr>
-          <p:nvPr>
-            <p:ph type="ctrTitle"/>
-          </p:nvPr>
-        </p:nvSpPr>
-        <p:spPr>
-          <a:xfrm>
-            <a:off x="1421176" y="325820"/>
-            <a:ext cx="9232135" cy="533101"/>
-          </a:xfrm>
-        </p:spPr>
-        <p:txBody>
-          <a:bodyPr>
-            <a:noAutofit/>
-          </a:bodyPr>
-          <a:lstStyle/>
-          <a:p>
-            <a:r>
-              <a:rPr lang="tr-TR" sz="2800" b="1" dirty="0">
-                <a:solidFill>
-                  <a:srgbClr val="CD1F26"/>
-                </a:solidFill>
-                <a:latin typeface="Arial" panose="020B0604020202020204" pitchFamily="34" charset="0"/>
-                <a:ea typeface="Verdana" panose="020B0604030504040204" pitchFamily="34" charset="0"/>
-                <a:cs typeface="Arial" panose="020B0604020202020204" pitchFamily="34" charset="0"/>
-              </a:rPr>
-              <a:t>NiFi </a:t>
-            </a:r>
-            <a:r>
-              <a:rPr lang="tr-TR" sz="2800" b="1" dirty="0" err="1">
-                <a:solidFill>
-                  <a:srgbClr val="CD1F26"/>
-                </a:solidFill>
-                <a:latin typeface="Arial" panose="020B0604020202020204" pitchFamily="34" charset="0"/>
-                <a:ea typeface="Verdana" panose="020B0604030504040204" pitchFamily="34" charset="0"/>
-                <a:cs typeface="Arial" panose="020B0604020202020204" pitchFamily="34" charset="0"/>
-              </a:rPr>
-              <a:t>Mysql’den</a:t>
-            </a:r>
-            <a:r>
-              <a:rPr lang="tr-TR" sz="2800" b="1" dirty="0">
-                <a:solidFill>
-                  <a:srgbClr val="CD1F26"/>
-                </a:solidFill>
-                <a:latin typeface="Arial" panose="020B0604020202020204" pitchFamily="34" charset="0"/>
-                <a:ea typeface="Verdana" panose="020B0604030504040204" pitchFamily="34" charset="0"/>
-                <a:cs typeface="Arial" panose="020B0604020202020204" pitchFamily="34" charset="0"/>
-              </a:rPr>
-              <a:t> Kafka’ya </a:t>
-            </a:r>
-            <a:r>
-              <a:rPr lang="tr-TR" sz="2800" b="1" dirty="0" err="1">
-                <a:solidFill>
-                  <a:srgbClr val="CD1F26"/>
-                </a:solidFill>
-                <a:latin typeface="Arial" panose="020B0604020202020204" pitchFamily="34" charset="0"/>
-                <a:ea typeface="Verdana" panose="020B0604030504040204" pitchFamily="34" charset="0"/>
-                <a:cs typeface="Arial" panose="020B0604020202020204" pitchFamily="34" charset="0"/>
-              </a:rPr>
-              <a:t>incremental</a:t>
-            </a:r>
-            <a:r>
-              <a:rPr lang="tr-TR" sz="2800" b="1" dirty="0">
-                <a:solidFill>
-                  <a:srgbClr val="CD1F26"/>
-                </a:solidFill>
-                <a:latin typeface="Arial" panose="020B0604020202020204" pitchFamily="34" charset="0"/>
-                <a:ea typeface="Verdana" panose="020B0604030504040204" pitchFamily="34" charset="0"/>
-                <a:cs typeface="Arial" panose="020B0604020202020204" pitchFamily="34" charset="0"/>
-              </a:rPr>
-              <a:t> veri akışı</a:t>
-            </a:r>
-            <a:endParaRPr lang="en-US" sz="2800" b="1" dirty="0">
-              <a:solidFill>
-                <a:srgbClr val="CD1F26"/>
-              </a:solidFill>
-              <a:latin typeface="Arial" panose="020B0604020202020204" pitchFamily="34" charset="0"/>
-              <a:ea typeface="Verdana" panose="020B0604030504040204" pitchFamily="34" charset="0"/>
-              <a:cs typeface="Arial" panose="020B0604020202020204" pitchFamily="34" charset="0"/>
-            </a:endParaRPr>
-          </a:p>
-        </p:txBody>
-      </p:sp>
-      <p:sp>
-        <p:nvSpPr>
-          <p:cNvPr id="19" name="İçerik Yer Tutucusu 2"/>
-          <p:cNvSpPr txBox="1">
-            <a:spLocks/>
-          </p:cNvSpPr>
-          <p:nvPr/>
-        </p:nvSpPr>
-        <p:spPr>
-          <a:xfrm>
-            <a:off x="1577667" y="1011122"/>
-            <a:ext cx="9070528" cy="4167487"/>
-          </a:xfrm>
-          <a:prstGeom prst="rect">
-            <a:avLst/>
-          </a:prstGeom>
-        </p:spPr>
-        <p:txBody>
-          <a:bodyPr vert="horz" lIns="91440" tIns="45720" rIns="91440" bIns="45720" rtlCol="0">
-            <a:normAutofit lnSpcReduction="10000"/>
-          </a:bodyPr>
-          <a:lstStyle>
-            <a:lvl1pPr marL="0" indent="0" algn="ctr" defTabSz="914400" rtl="0" eaLnBrk="1" latinLnBrk="0" hangingPunct="1">
-              <a:lnSpc>
-                <a:spcPct val="90000"/>
-              </a:lnSpc>
-              <a:spcBef>
-                <a:spcPts val="1000"/>
-              </a:spcBef>
-              <a:buFont typeface="Arial" panose="020B0604020202020204" pitchFamily="34" charset="0"/>
-              <a:buNone/>
-              <a:defRPr sz="2400" kern="1200">
-                <a:solidFill>
-                  <a:schemeClr val="tx1"/>
-                </a:solidFill>
-                <a:latin typeface="+mn-lt"/>
-                <a:ea typeface="+mn-ea"/>
-                <a:cs typeface="+mn-cs"/>
-              </a:defRPr>
-            </a:lvl1pPr>
-            <a:lvl2pPr marL="457200" indent="0" algn="ctr" defTabSz="914400" rtl="0" eaLnBrk="1" latinLnBrk="0" hangingPunct="1">
-              <a:lnSpc>
-                <a:spcPct val="90000"/>
-              </a:lnSpc>
-              <a:spcBef>
-                <a:spcPts val="500"/>
-              </a:spcBef>
-              <a:buFont typeface="Arial" panose="020B0604020202020204" pitchFamily="34" charset="0"/>
-              <a:buNone/>
-              <a:defRPr sz="2000" kern="1200">
-                <a:solidFill>
-                  <a:schemeClr val="tx1"/>
-                </a:solidFill>
-                <a:latin typeface="+mn-lt"/>
-                <a:ea typeface="+mn-ea"/>
-                <a:cs typeface="+mn-cs"/>
-              </a:defRPr>
-            </a:lvl2pPr>
-            <a:lvl3pPr marL="914400" indent="0" algn="ctr" defTabSz="914400" rtl="0" eaLnBrk="1" latinLnBrk="0" hangingPunct="1">
-              <a:lnSpc>
-                <a:spcPct val="90000"/>
-              </a:lnSpc>
-              <a:spcBef>
-                <a:spcPts val="500"/>
-              </a:spcBef>
-              <a:buFont typeface="Arial" panose="020B0604020202020204" pitchFamily="34" charset="0"/>
-              <a:buNone/>
-              <a:defRPr sz="1800" kern="1200">
-                <a:solidFill>
-                  <a:schemeClr val="tx1"/>
-                </a:solidFill>
-                <a:latin typeface="+mn-lt"/>
-                <a:ea typeface="+mn-ea"/>
-                <a:cs typeface="+mn-cs"/>
-              </a:defRPr>
-            </a:lvl3pPr>
-            <a:lvl4pPr marL="1371600" indent="0" algn="ctr" defTabSz="914400" rtl="0" eaLnBrk="1" latinLnBrk="0" hangingPunct="1">
-              <a:lnSpc>
-                <a:spcPct val="90000"/>
-              </a:lnSpc>
-              <a:spcBef>
-                <a:spcPts val="500"/>
-              </a:spcBef>
-              <a:buFont typeface="Arial" panose="020B0604020202020204" pitchFamily="34" charset="0"/>
-              <a:buNone/>
-              <a:defRPr sz="1600" kern="1200">
-                <a:solidFill>
-                  <a:schemeClr val="tx1"/>
-                </a:solidFill>
-                <a:latin typeface="+mn-lt"/>
-                <a:ea typeface="+mn-ea"/>
-                <a:cs typeface="+mn-cs"/>
-              </a:defRPr>
-            </a:lvl4pPr>
-            <a:lvl5pPr marL="1828800" indent="0" algn="ctr" defTabSz="914400" rtl="0" eaLnBrk="1" latinLnBrk="0" hangingPunct="1">
-              <a:lnSpc>
-                <a:spcPct val="90000"/>
-              </a:lnSpc>
-              <a:spcBef>
-                <a:spcPts val="500"/>
-              </a:spcBef>
-              <a:buFont typeface="Arial" panose="020B0604020202020204" pitchFamily="34" charset="0"/>
-              <a:buNone/>
-              <a:defRPr sz="1600" kern="1200">
-                <a:solidFill>
-                  <a:schemeClr val="tx1"/>
-                </a:solidFill>
-                <a:latin typeface="+mn-lt"/>
-                <a:ea typeface="+mn-ea"/>
-                <a:cs typeface="+mn-cs"/>
-              </a:defRPr>
-            </a:lvl5pPr>
-            <a:lvl6pPr marL="2286000" indent="0" algn="ctr" defTabSz="914400" rtl="0" eaLnBrk="1" latinLnBrk="0" hangingPunct="1">
-              <a:lnSpc>
-                <a:spcPct val="90000"/>
-              </a:lnSpc>
-              <a:spcBef>
-                <a:spcPts val="500"/>
-              </a:spcBef>
-              <a:buFont typeface="Arial" panose="020B0604020202020204" pitchFamily="34" charset="0"/>
-              <a:buNone/>
-              <a:defRPr sz="1600" kern="1200">
-                <a:solidFill>
-                  <a:schemeClr val="tx1"/>
-                </a:solidFill>
-                <a:latin typeface="+mn-lt"/>
-                <a:ea typeface="+mn-ea"/>
-                <a:cs typeface="+mn-cs"/>
-              </a:defRPr>
-            </a:lvl6pPr>
-            <a:lvl7pPr marL="2743200" indent="0" algn="ctr" defTabSz="914400" rtl="0" eaLnBrk="1" latinLnBrk="0" hangingPunct="1">
-              <a:lnSpc>
-                <a:spcPct val="90000"/>
-              </a:lnSpc>
-              <a:spcBef>
-                <a:spcPts val="500"/>
-              </a:spcBef>
-              <a:buFont typeface="Arial" panose="020B0604020202020204" pitchFamily="34" charset="0"/>
-              <a:buNone/>
-              <a:defRPr sz="1600" kern="1200">
-                <a:solidFill>
-                  <a:schemeClr val="tx1"/>
-                </a:solidFill>
-                <a:latin typeface="+mn-lt"/>
-                <a:ea typeface="+mn-ea"/>
-                <a:cs typeface="+mn-cs"/>
-              </a:defRPr>
-            </a:lvl7pPr>
-            <a:lvl8pPr marL="3200400" indent="0" algn="ctr" defTabSz="914400" rtl="0" eaLnBrk="1" latinLnBrk="0" hangingPunct="1">
-              <a:lnSpc>
-                <a:spcPct val="90000"/>
-              </a:lnSpc>
-              <a:spcBef>
-                <a:spcPts val="500"/>
-              </a:spcBef>
-              <a:buFont typeface="Arial" panose="020B0604020202020204" pitchFamily="34" charset="0"/>
-              <a:buNone/>
-              <a:defRPr sz="1600" kern="1200">
-                <a:solidFill>
-                  <a:schemeClr val="tx1"/>
-                </a:solidFill>
-                <a:latin typeface="+mn-lt"/>
-                <a:ea typeface="+mn-ea"/>
-                <a:cs typeface="+mn-cs"/>
-              </a:defRPr>
-            </a:lvl8pPr>
-            <a:lvl9pPr marL="3657600" indent="0" algn="ctr" defTabSz="914400" rtl="0" eaLnBrk="1" latinLnBrk="0" hangingPunct="1">
-              <a:lnSpc>
-                <a:spcPct val="90000"/>
-              </a:lnSpc>
-              <a:spcBef>
-                <a:spcPts val="500"/>
-              </a:spcBef>
-              <a:buFont typeface="Arial" panose="020B0604020202020204" pitchFamily="34" charset="0"/>
-              <a:buNone/>
-              <a:defRPr sz="1600" kern="1200">
-                <a:solidFill>
-                  <a:schemeClr val="tx1"/>
-                </a:solidFill>
-                <a:latin typeface="+mn-lt"/>
-                <a:ea typeface="+mn-ea"/>
-                <a:cs typeface="+mn-cs"/>
-              </a:defRPr>
-            </a:lvl9pPr>
-          </a:lstStyle>
-          <a:p>
-            <a:pPr marL="457200" indent="-457200" algn="l">
-              <a:lnSpc>
-                <a:spcPct val="150000"/>
-              </a:lnSpc>
-              <a:buFont typeface="+mj-lt"/>
-              <a:buAutoNum type="arabicPeriod"/>
-            </a:pPr>
-            <a:r>
-              <a:rPr lang="tr-TR" dirty="0" err="1">
-                <a:latin typeface="Roboto"/>
-              </a:rPr>
-              <a:t>Mysql</a:t>
-            </a:r>
-            <a:r>
-              <a:rPr lang="tr-TR" dirty="0">
-                <a:latin typeface="Roboto"/>
-              </a:rPr>
-              <a:t> veri tabanında hazırlık yap.</a:t>
-            </a:r>
-          </a:p>
-          <a:p>
-            <a:pPr marL="914400" lvl="1" indent="-457200" algn="l">
-              <a:lnSpc>
-                <a:spcPct val="150000"/>
-              </a:lnSpc>
-              <a:buFont typeface="+mj-lt"/>
-              <a:buAutoNum type="arabicPeriod"/>
-            </a:pPr>
-            <a:r>
-              <a:rPr lang="tr-TR" sz="1100" dirty="0" err="1">
-                <a:latin typeface="Consolas" panose="020B0609020204030204" pitchFamily="49" charset="0"/>
-                <a:hlinkClick r:id="rId2"/>
-              </a:rPr>
-              <a:t>wget</a:t>
-            </a:r>
-            <a:r>
-              <a:rPr lang="tr-TR" sz="1100" dirty="0">
-                <a:latin typeface="Consolas" panose="020B0609020204030204" pitchFamily="49" charset="0"/>
-                <a:hlinkClick r:id="rId2"/>
-              </a:rPr>
-              <a:t> http://veribilimi.co/data/iris_with_pk.csv</a:t>
-            </a:r>
-            <a:r>
-              <a:rPr lang="tr-TR" sz="1100" dirty="0">
-                <a:latin typeface="Consolas" panose="020B0609020204030204" pitchFamily="49" charset="0"/>
-              </a:rPr>
-              <a:t> ile /</a:t>
-            </a:r>
-            <a:r>
-              <a:rPr lang="tr-TR" sz="1100" dirty="0" err="1">
-                <a:latin typeface="Consolas" panose="020B0609020204030204" pitchFamily="49" charset="0"/>
-              </a:rPr>
-              <a:t>home</a:t>
-            </a:r>
-            <a:r>
-              <a:rPr lang="tr-TR" sz="1100" dirty="0">
-                <a:latin typeface="Consolas" panose="020B0609020204030204" pitchFamily="49" charset="0"/>
-              </a:rPr>
-              <a:t>/</a:t>
-            </a:r>
-            <a:r>
-              <a:rPr lang="tr-TR" sz="1100" dirty="0" err="1">
-                <a:latin typeface="Consolas" panose="020B0609020204030204" pitchFamily="49" charset="0"/>
-              </a:rPr>
-              <a:t>maria_dev</a:t>
-            </a:r>
-            <a:r>
-              <a:rPr lang="tr-TR" sz="1100" dirty="0">
-                <a:latin typeface="Consolas" panose="020B0609020204030204" pitchFamily="49" charset="0"/>
-              </a:rPr>
-              <a:t> </a:t>
-            </a:r>
-            <a:r>
-              <a:rPr lang="tr-TR" sz="1100" dirty="0" err="1">
-                <a:latin typeface="Consolas" panose="020B0609020204030204" pitchFamily="49" charset="0"/>
-              </a:rPr>
-              <a:t>diznine</a:t>
-            </a:r>
-            <a:r>
-              <a:rPr lang="tr-TR" sz="1100" dirty="0">
-                <a:latin typeface="Consolas" panose="020B0609020204030204" pitchFamily="49" charset="0"/>
-              </a:rPr>
-              <a:t> veri ardışık artan </a:t>
-            </a:r>
-            <a:r>
-              <a:rPr lang="tr-TR" sz="1100" dirty="0" err="1">
-                <a:latin typeface="Consolas" panose="020B0609020204030204" pitchFamily="49" charset="0"/>
-              </a:rPr>
-              <a:t>Id</a:t>
-            </a:r>
-            <a:r>
-              <a:rPr lang="tr-TR" sz="1100" dirty="0">
-                <a:latin typeface="Consolas" panose="020B0609020204030204" pitchFamily="49" charset="0"/>
-              </a:rPr>
-              <a:t> sütununa sahip iris veri setini indir.</a:t>
-            </a:r>
-          </a:p>
-          <a:p>
-            <a:pPr marL="914400" lvl="1" indent="-457200" algn="l">
-              <a:lnSpc>
-                <a:spcPct val="150000"/>
-              </a:lnSpc>
-              <a:buFont typeface="+mj-lt"/>
-              <a:buAutoNum type="arabicPeriod"/>
-            </a:pPr>
-            <a:r>
-              <a:rPr lang="tr-TR" sz="1100" dirty="0" err="1">
-                <a:latin typeface="Consolas" panose="020B0609020204030204" pitchFamily="49" charset="0"/>
-              </a:rPr>
-              <a:t>Mysql’e</a:t>
-            </a:r>
-            <a:r>
-              <a:rPr lang="tr-TR" sz="1100" dirty="0">
-                <a:latin typeface="Consolas" panose="020B0609020204030204" pitchFamily="49" charset="0"/>
-              </a:rPr>
-              <a:t> bağlan, </a:t>
-            </a:r>
-            <a:r>
-              <a:rPr lang="tr-TR" sz="1100" dirty="0" err="1">
-                <a:latin typeface="Consolas" panose="020B0609020204030204" pitchFamily="49" charset="0"/>
-              </a:rPr>
-              <a:t>azhadoop</a:t>
-            </a:r>
-            <a:r>
-              <a:rPr lang="tr-TR" sz="1100" dirty="0">
-                <a:latin typeface="Consolas" panose="020B0609020204030204" pitchFamily="49" charset="0"/>
-              </a:rPr>
-              <a:t> veri tabanını seç</a:t>
-            </a:r>
-          </a:p>
-          <a:p>
-            <a:pPr marL="914400" lvl="1" indent="-457200" algn="l">
-              <a:lnSpc>
-                <a:spcPct val="150000"/>
-              </a:lnSpc>
-              <a:buFont typeface="+mj-lt"/>
-              <a:buAutoNum type="arabicPeriod"/>
-            </a:pPr>
-            <a:r>
-              <a:rPr lang="tr-TR" sz="1100" dirty="0" err="1">
-                <a:latin typeface="Consolas" panose="020B0609020204030204" pitchFamily="49" charset="0"/>
-              </a:rPr>
-              <a:t>mysql</a:t>
-            </a:r>
-            <a:r>
-              <a:rPr lang="tr-TR" sz="1100" dirty="0">
-                <a:latin typeface="Consolas" panose="020B0609020204030204" pitchFamily="49" charset="0"/>
-              </a:rPr>
-              <a:t>&gt; </a:t>
-            </a:r>
-            <a:r>
-              <a:rPr lang="tr-TR" sz="1100" dirty="0" err="1">
-                <a:latin typeface="Consolas" panose="020B0609020204030204" pitchFamily="49" charset="0"/>
-              </a:rPr>
-              <a:t>create</a:t>
-            </a:r>
-            <a:r>
-              <a:rPr lang="tr-TR" sz="1100" dirty="0">
-                <a:latin typeface="Consolas" panose="020B0609020204030204" pitchFamily="49" charset="0"/>
-              </a:rPr>
-              <a:t> </a:t>
-            </a:r>
-            <a:r>
-              <a:rPr lang="tr-TR" sz="1100" dirty="0" err="1">
-                <a:latin typeface="Consolas" panose="020B0609020204030204" pitchFamily="49" charset="0"/>
-              </a:rPr>
-              <a:t>table</a:t>
-            </a:r>
-            <a:r>
-              <a:rPr lang="tr-TR" sz="1100" dirty="0">
-                <a:latin typeface="Consolas" panose="020B0609020204030204" pitchFamily="49" charset="0"/>
-              </a:rPr>
-              <a:t> </a:t>
-            </a:r>
-            <a:r>
-              <a:rPr lang="tr-TR" sz="1100" dirty="0" err="1">
-                <a:latin typeface="Consolas" panose="020B0609020204030204" pitchFamily="49" charset="0"/>
-              </a:rPr>
-              <a:t>iris_with_pk</a:t>
-            </a:r>
-            <a:r>
-              <a:rPr lang="tr-TR" sz="1100" dirty="0">
-                <a:latin typeface="Consolas" panose="020B0609020204030204" pitchFamily="49" charset="0"/>
-              </a:rPr>
-              <a:t>(</a:t>
-            </a:r>
-            <a:r>
-              <a:rPr lang="tr-TR" sz="1100" dirty="0" err="1">
-                <a:latin typeface="Consolas" panose="020B0609020204030204" pitchFamily="49" charset="0"/>
-              </a:rPr>
-              <a:t>Id</a:t>
-            </a:r>
-            <a:r>
-              <a:rPr lang="tr-TR" sz="1100" dirty="0">
-                <a:latin typeface="Consolas" panose="020B0609020204030204" pitchFamily="49" charset="0"/>
-              </a:rPr>
-              <a:t> </a:t>
-            </a:r>
-            <a:r>
-              <a:rPr lang="tr-TR" sz="1100" dirty="0" err="1">
-                <a:latin typeface="Consolas" panose="020B0609020204030204" pitchFamily="49" charset="0"/>
-              </a:rPr>
-              <a:t>int</a:t>
-            </a:r>
-            <a:r>
-              <a:rPr lang="tr-TR" sz="1100" dirty="0">
-                <a:latin typeface="Consolas" panose="020B0609020204030204" pitchFamily="49" charset="0"/>
-              </a:rPr>
-              <a:t>  NOT NULL AUTO_INCREMENT, </a:t>
-            </a:r>
-            <a:r>
-              <a:rPr lang="tr-TR" sz="1100" dirty="0" err="1">
-                <a:latin typeface="Consolas" panose="020B0609020204030204" pitchFamily="49" charset="0"/>
-              </a:rPr>
-              <a:t>SepalLengthCm</a:t>
-            </a:r>
-            <a:r>
-              <a:rPr lang="tr-TR" sz="1100" dirty="0">
-                <a:latin typeface="Consolas" panose="020B0609020204030204" pitchFamily="49" charset="0"/>
-              </a:rPr>
-              <a:t> </a:t>
-            </a:r>
-            <a:r>
-              <a:rPr lang="tr-TR" sz="1100" dirty="0" err="1">
-                <a:latin typeface="Consolas" panose="020B0609020204030204" pitchFamily="49" charset="0"/>
-              </a:rPr>
-              <a:t>double</a:t>
-            </a:r>
-            <a:r>
-              <a:rPr lang="tr-TR" sz="1100" dirty="0">
-                <a:latin typeface="Consolas" panose="020B0609020204030204" pitchFamily="49" charset="0"/>
-              </a:rPr>
-              <a:t>, </a:t>
-            </a:r>
-            <a:r>
-              <a:rPr lang="tr-TR" sz="1100" dirty="0" err="1">
-                <a:latin typeface="Consolas" panose="020B0609020204030204" pitchFamily="49" charset="0"/>
-              </a:rPr>
-              <a:t>SepalWidthCm</a:t>
-            </a:r>
-            <a:r>
-              <a:rPr lang="tr-TR" sz="1100" dirty="0">
-                <a:latin typeface="Consolas" panose="020B0609020204030204" pitchFamily="49" charset="0"/>
-              </a:rPr>
-              <a:t> </a:t>
-            </a:r>
-            <a:r>
-              <a:rPr lang="tr-TR" sz="1100" dirty="0" err="1">
-                <a:latin typeface="Consolas" panose="020B0609020204030204" pitchFamily="49" charset="0"/>
-              </a:rPr>
-              <a:t>double</a:t>
-            </a:r>
-            <a:r>
-              <a:rPr lang="tr-TR" sz="1100" dirty="0">
-                <a:latin typeface="Consolas" panose="020B0609020204030204" pitchFamily="49" charset="0"/>
-              </a:rPr>
-              <a:t>, </a:t>
-            </a:r>
-            <a:r>
-              <a:rPr lang="tr-TR" sz="1100" dirty="0" err="1">
-                <a:latin typeface="Consolas" panose="020B0609020204030204" pitchFamily="49" charset="0"/>
-              </a:rPr>
-              <a:t>PetalLengthCm</a:t>
-            </a:r>
-            <a:r>
-              <a:rPr lang="tr-TR" sz="1100" dirty="0">
-                <a:latin typeface="Consolas" panose="020B0609020204030204" pitchFamily="49" charset="0"/>
-              </a:rPr>
-              <a:t> </a:t>
-            </a:r>
-            <a:r>
-              <a:rPr lang="tr-TR" sz="1100" dirty="0" err="1">
-                <a:latin typeface="Consolas" panose="020B0609020204030204" pitchFamily="49" charset="0"/>
-              </a:rPr>
-              <a:t>double</a:t>
-            </a:r>
-            <a:r>
-              <a:rPr lang="tr-TR" sz="1100" dirty="0">
-                <a:latin typeface="Consolas" panose="020B0609020204030204" pitchFamily="49" charset="0"/>
-              </a:rPr>
-              <a:t>, </a:t>
-            </a:r>
-            <a:r>
-              <a:rPr lang="tr-TR" sz="1100" dirty="0" err="1">
-                <a:latin typeface="Consolas" panose="020B0609020204030204" pitchFamily="49" charset="0"/>
-              </a:rPr>
-              <a:t>PetalWidthCm</a:t>
-            </a:r>
-            <a:r>
-              <a:rPr lang="tr-TR" sz="1100" dirty="0">
-                <a:latin typeface="Consolas" panose="020B0609020204030204" pitchFamily="49" charset="0"/>
-              </a:rPr>
-              <a:t> </a:t>
-            </a:r>
-            <a:r>
-              <a:rPr lang="tr-TR" sz="1100" dirty="0" err="1">
-                <a:latin typeface="Consolas" panose="020B0609020204030204" pitchFamily="49" charset="0"/>
-              </a:rPr>
-              <a:t>double</a:t>
-            </a:r>
-            <a:r>
-              <a:rPr lang="tr-TR" sz="1100" dirty="0">
-                <a:latin typeface="Consolas" panose="020B0609020204030204" pitchFamily="49" charset="0"/>
-              </a:rPr>
-              <a:t>, </a:t>
-            </a:r>
-            <a:r>
-              <a:rPr lang="tr-TR" sz="1100" dirty="0" err="1">
-                <a:latin typeface="Consolas" panose="020B0609020204030204" pitchFamily="49" charset="0"/>
-              </a:rPr>
-              <a:t>Species</a:t>
-            </a:r>
-            <a:r>
-              <a:rPr lang="tr-TR" sz="1100" dirty="0">
-                <a:latin typeface="Consolas" panose="020B0609020204030204" pitchFamily="49" charset="0"/>
-              </a:rPr>
-              <a:t> VARCHAR(20), PRIMARY KEY (</a:t>
-            </a:r>
-            <a:r>
-              <a:rPr lang="tr-TR" sz="1100" dirty="0" err="1">
-                <a:latin typeface="Consolas" panose="020B0609020204030204" pitchFamily="49" charset="0"/>
-              </a:rPr>
-              <a:t>Id</a:t>
-            </a:r>
-            <a:r>
-              <a:rPr lang="tr-TR" sz="1100" dirty="0">
-                <a:latin typeface="Consolas" panose="020B0609020204030204" pitchFamily="49" charset="0"/>
-              </a:rPr>
-              <a:t>));  komutuyla tablo yarat</a:t>
-            </a:r>
-          </a:p>
-          <a:p>
-            <a:pPr marL="914400" lvl="1" indent="-457200" algn="l">
-              <a:lnSpc>
-                <a:spcPct val="150000"/>
-              </a:lnSpc>
-              <a:buFont typeface="+mj-lt"/>
-              <a:buAutoNum type="arabicPeriod"/>
-            </a:pPr>
-            <a:r>
-              <a:rPr lang="tr-TR" sz="1100" dirty="0" err="1">
-                <a:latin typeface="Consolas" panose="020B0609020204030204" pitchFamily="49" charset="0"/>
-              </a:rPr>
-              <a:t>mysql</a:t>
-            </a:r>
-            <a:r>
-              <a:rPr lang="tr-TR" sz="1100" dirty="0">
-                <a:latin typeface="Consolas" panose="020B0609020204030204" pitchFamily="49" charset="0"/>
-              </a:rPr>
-              <a:t>&gt; </a:t>
-            </a:r>
-            <a:r>
-              <a:rPr lang="tr-TR" sz="1100" dirty="0" err="1">
-                <a:latin typeface="Consolas" panose="020B0609020204030204" pitchFamily="49" charset="0"/>
-              </a:rPr>
-              <a:t>load</a:t>
-            </a:r>
-            <a:r>
-              <a:rPr lang="tr-TR" sz="1100" dirty="0">
-                <a:latin typeface="Consolas" panose="020B0609020204030204" pitchFamily="49" charset="0"/>
-              </a:rPr>
-              <a:t> data </a:t>
-            </a:r>
-            <a:r>
-              <a:rPr lang="tr-TR" sz="1100" dirty="0" err="1">
-                <a:latin typeface="Consolas" panose="020B0609020204030204" pitchFamily="49" charset="0"/>
-              </a:rPr>
-              <a:t>local</a:t>
-            </a:r>
-            <a:r>
-              <a:rPr lang="tr-TR" sz="1100" dirty="0">
-                <a:latin typeface="Consolas" panose="020B0609020204030204" pitchFamily="49" charset="0"/>
-              </a:rPr>
-              <a:t> </a:t>
-            </a:r>
-            <a:r>
-              <a:rPr lang="tr-TR" sz="1100" dirty="0" err="1">
-                <a:latin typeface="Consolas" panose="020B0609020204030204" pitchFamily="49" charset="0"/>
-              </a:rPr>
-              <a:t>infile</a:t>
-            </a:r>
-            <a:r>
-              <a:rPr lang="tr-TR" sz="1100" dirty="0">
-                <a:latin typeface="Consolas" panose="020B0609020204030204" pitchFamily="49" charset="0"/>
-              </a:rPr>
-              <a:t> '/</a:t>
-            </a:r>
-            <a:r>
-              <a:rPr lang="tr-TR" sz="1100" dirty="0" err="1">
-                <a:latin typeface="Consolas" panose="020B0609020204030204" pitchFamily="49" charset="0"/>
-              </a:rPr>
-              <a:t>home</a:t>
-            </a:r>
-            <a:r>
-              <a:rPr lang="tr-TR" sz="1100" dirty="0">
-                <a:latin typeface="Consolas" panose="020B0609020204030204" pitchFamily="49" charset="0"/>
-              </a:rPr>
-              <a:t>/</a:t>
-            </a:r>
-            <a:r>
-              <a:rPr lang="tr-TR" sz="1100" dirty="0" err="1">
-                <a:latin typeface="Consolas" panose="020B0609020204030204" pitchFamily="49" charset="0"/>
-              </a:rPr>
-              <a:t>maria_dev</a:t>
-            </a:r>
-            <a:r>
-              <a:rPr lang="tr-TR" sz="1100" dirty="0">
-                <a:latin typeface="Consolas" panose="020B0609020204030204" pitchFamily="49" charset="0"/>
-              </a:rPr>
-              <a:t>/iris_with_pk.csv' </a:t>
-            </a:r>
-            <a:r>
-              <a:rPr lang="tr-TR" sz="1100" dirty="0" err="1">
-                <a:latin typeface="Consolas" panose="020B0609020204030204" pitchFamily="49" charset="0"/>
-              </a:rPr>
-              <a:t>into</a:t>
-            </a:r>
-            <a:r>
-              <a:rPr lang="tr-TR" sz="1100" dirty="0">
-                <a:latin typeface="Consolas" panose="020B0609020204030204" pitchFamily="49" charset="0"/>
-              </a:rPr>
-              <a:t> </a:t>
-            </a:r>
-            <a:r>
-              <a:rPr lang="tr-TR" sz="1100" dirty="0" err="1">
-                <a:latin typeface="Consolas" panose="020B0609020204030204" pitchFamily="49" charset="0"/>
-              </a:rPr>
-              <a:t>table</a:t>
-            </a:r>
-            <a:r>
-              <a:rPr lang="tr-TR" sz="1100" dirty="0">
-                <a:latin typeface="Consolas" panose="020B0609020204030204" pitchFamily="49" charset="0"/>
-              </a:rPr>
-              <a:t> </a:t>
-            </a:r>
-            <a:r>
-              <a:rPr lang="tr-TR" sz="1100" dirty="0" err="1">
-                <a:latin typeface="Consolas" panose="020B0609020204030204" pitchFamily="49" charset="0"/>
-              </a:rPr>
-              <a:t>iris_with_pk</a:t>
-            </a:r>
-            <a:r>
-              <a:rPr lang="tr-TR" sz="1100" dirty="0">
-                <a:latin typeface="Consolas" panose="020B0609020204030204" pitchFamily="49" charset="0"/>
-              </a:rPr>
-              <a:t> </a:t>
-            </a:r>
-            <a:r>
-              <a:rPr lang="tr-TR" sz="1100" dirty="0" err="1">
-                <a:latin typeface="Consolas" panose="020B0609020204030204" pitchFamily="49" charset="0"/>
-              </a:rPr>
-              <a:t>fields</a:t>
-            </a:r>
-            <a:r>
-              <a:rPr lang="tr-TR" sz="1100" dirty="0">
-                <a:latin typeface="Consolas" panose="020B0609020204030204" pitchFamily="49" charset="0"/>
-              </a:rPr>
-              <a:t> </a:t>
-            </a:r>
-            <a:r>
-              <a:rPr lang="tr-TR" sz="1100" dirty="0" err="1">
-                <a:latin typeface="Consolas" panose="020B0609020204030204" pitchFamily="49" charset="0"/>
-              </a:rPr>
-              <a:t>terminated</a:t>
-            </a:r>
-            <a:r>
-              <a:rPr lang="tr-TR" sz="1100" dirty="0">
-                <a:latin typeface="Consolas" panose="020B0609020204030204" pitchFamily="49" charset="0"/>
-              </a:rPr>
-              <a:t> </a:t>
-            </a:r>
-            <a:r>
-              <a:rPr lang="tr-TR" sz="1100" dirty="0" err="1">
-                <a:latin typeface="Consolas" panose="020B0609020204030204" pitchFamily="49" charset="0"/>
-              </a:rPr>
-              <a:t>by</a:t>
-            </a:r>
-            <a:r>
-              <a:rPr lang="tr-TR" sz="1100" dirty="0">
-                <a:latin typeface="Consolas" panose="020B0609020204030204" pitchFamily="49" charset="0"/>
-              </a:rPr>
-              <a:t> ',' </a:t>
-            </a:r>
-            <a:r>
-              <a:rPr lang="tr-TR" sz="1100" dirty="0" err="1">
-                <a:latin typeface="Consolas" panose="020B0609020204030204" pitchFamily="49" charset="0"/>
-              </a:rPr>
-              <a:t>enclosed</a:t>
-            </a:r>
-            <a:r>
-              <a:rPr lang="tr-TR" sz="1100" dirty="0">
-                <a:latin typeface="Consolas" panose="020B0609020204030204" pitchFamily="49" charset="0"/>
-              </a:rPr>
-              <a:t> </a:t>
-            </a:r>
-            <a:r>
-              <a:rPr lang="tr-TR" sz="1100" dirty="0" err="1">
-                <a:latin typeface="Consolas" panose="020B0609020204030204" pitchFamily="49" charset="0"/>
-              </a:rPr>
-              <a:t>by</a:t>
-            </a:r>
-            <a:r>
-              <a:rPr lang="tr-TR" sz="1100" dirty="0">
-                <a:latin typeface="Consolas" panose="020B0609020204030204" pitchFamily="49" charset="0"/>
-              </a:rPr>
-              <a:t> '"' </a:t>
-            </a:r>
-            <a:r>
-              <a:rPr lang="tr-TR" sz="1100" dirty="0" err="1">
-                <a:latin typeface="Consolas" panose="020B0609020204030204" pitchFamily="49" charset="0"/>
-              </a:rPr>
-              <a:t>lines</a:t>
-            </a:r>
-            <a:r>
-              <a:rPr lang="tr-TR" sz="1100" dirty="0">
-                <a:latin typeface="Consolas" panose="020B0609020204030204" pitchFamily="49" charset="0"/>
-              </a:rPr>
-              <a:t> </a:t>
-            </a:r>
-            <a:r>
-              <a:rPr lang="tr-TR" sz="1100" dirty="0" err="1">
-                <a:latin typeface="Consolas" panose="020B0609020204030204" pitchFamily="49" charset="0"/>
-              </a:rPr>
-              <a:t>terminated</a:t>
-            </a:r>
-            <a:r>
-              <a:rPr lang="tr-TR" sz="1100" dirty="0">
-                <a:latin typeface="Consolas" panose="020B0609020204030204" pitchFamily="49" charset="0"/>
-              </a:rPr>
-              <a:t> </a:t>
-            </a:r>
-            <a:r>
-              <a:rPr lang="tr-TR" sz="1100" dirty="0" err="1">
-                <a:latin typeface="Consolas" panose="020B0609020204030204" pitchFamily="49" charset="0"/>
-              </a:rPr>
-              <a:t>by</a:t>
-            </a:r>
-            <a:r>
-              <a:rPr lang="tr-TR" sz="1100" dirty="0">
-                <a:latin typeface="Consolas" panose="020B0609020204030204" pitchFamily="49" charset="0"/>
-              </a:rPr>
-              <a:t> '\n'  (Id,SepalLengthCm,SepalWidthCm,PetalLengthCm,PetalWidthCm,Species); ile veri setini tabloya yükle</a:t>
-            </a:r>
-          </a:p>
-          <a:p>
-            <a:pPr marL="457200" indent="-457200" algn="l">
-              <a:lnSpc>
-                <a:spcPct val="150000"/>
-              </a:lnSpc>
-              <a:buFont typeface="+mj-lt"/>
-              <a:buAutoNum type="arabicPeriod"/>
-            </a:pPr>
-            <a:r>
-              <a:rPr lang="tr-TR" dirty="0" err="1">
-                <a:latin typeface="Roboto"/>
-              </a:rPr>
-              <a:t>Browser’a</a:t>
-            </a:r>
-            <a:r>
-              <a:rPr lang="tr-TR" dirty="0">
-                <a:latin typeface="Roboto"/>
-              </a:rPr>
-              <a:t> </a:t>
-            </a:r>
-            <a:r>
-              <a:rPr lang="tr-TR" sz="1900" dirty="0">
-                <a:solidFill>
-                  <a:srgbClr val="0070C0"/>
-                </a:solidFill>
-                <a:latin typeface="Consolas" panose="020B0609020204030204" pitchFamily="49" charset="0"/>
-              </a:rPr>
-              <a:t>http://sandbox.hortonworks.com:8090/nifi/ </a:t>
-            </a:r>
-            <a:r>
-              <a:rPr lang="tr-TR" dirty="0">
-                <a:latin typeface="Roboto"/>
-              </a:rPr>
-              <a:t>adresini gir ve NiFi </a:t>
-            </a:r>
-            <a:r>
-              <a:rPr lang="tr-TR" dirty="0" err="1">
-                <a:latin typeface="Roboto"/>
-              </a:rPr>
-              <a:t>arayüzünü</a:t>
-            </a:r>
-            <a:r>
-              <a:rPr lang="tr-TR" dirty="0">
-                <a:latin typeface="Roboto"/>
-              </a:rPr>
-              <a:t> gör. </a:t>
-            </a:r>
-            <a:endParaRPr lang="en-US" dirty="0">
-              <a:latin typeface="Roboto"/>
-            </a:endParaRPr>
-          </a:p>
-        </p:txBody>
-      </p:sp>
-      <p:pic>
-        <p:nvPicPr>
-          <p:cNvPr id="17" name="Resim 16">
-            <a:extLst>
-              <a:ext uri="{FF2B5EF4-FFF2-40B4-BE49-F238E27FC236}">
-                <a16:creationId xmlns:a16="http://schemas.microsoft.com/office/drawing/2014/main" id="{A91F8B91-5CA2-4A92-A59D-EEC04643833F}"/>
-              </a:ext>
-            </a:extLst>
-          </p:cNvPr>
-          <p:cNvPicPr>
-            <a:picLocks noChangeAspect="1"/>
-          </p:cNvPicPr>
-          <p:nvPr/>
-        </p:nvPicPr>
-        <p:blipFill>
-          <a:blip r:embed="rId3">
-            <a:extLst>
-              <a:ext uri="{28A0092B-C50C-407E-A947-70E740481C1C}">
-                <a14:useLocalDpi xmlns:a14="http://schemas.microsoft.com/office/drawing/2010/main" val="0"/>
-              </a:ext>
-            </a:extLst>
-          </a:blip>
-          <a:stretch>
-            <a:fillRect/>
-          </a:stretch>
-        </p:blipFill>
-        <p:spPr>
-          <a:xfrm>
-            <a:off x="340622" y="6362072"/>
-            <a:ext cx="2154700" cy="308365"/>
-          </a:xfrm>
-          <a:prstGeom prst="rect">
-            <a:avLst/>
-          </a:prstGeom>
-        </p:spPr>
-      </p:pic>
-    </p:spTree>
-    <p:extLst>
-      <p:ext uri="{BB962C8B-B14F-4D97-AF65-F5344CB8AC3E}">
-        <p14:creationId xmlns:p14="http://schemas.microsoft.com/office/powerpoint/2010/main" val="639339330"/>
-      </p:ext>
-    </p:extLst>
-  </p:cSld>
-  <p:clrMapOvr>
-    <a:masterClrMapping/>
-  </p:clrMapOvr>
 </p:sld>
 </file>
 
@@ -27242,7 +25601,7 @@
           <p:nvPr/>
         </p:nvPicPr>
         <p:blipFill>
-          <a:blip r:embed="rId3">
+          <a:blip r:embed="rId3" cstate="print">
             <a:extLst>
               <a:ext uri="{28A0092B-C50C-407E-A947-70E740481C1C}">
                 <a14:useLocalDpi xmlns:a14="http://schemas.microsoft.com/office/drawing/2010/main" val="0"/>
@@ -27869,7 +26228,7 @@
           <p:nvPr/>
         </p:nvPicPr>
         <p:blipFill>
-          <a:blip r:embed="rId3">
+          <a:blip r:embed="rId3" cstate="print">
             <a:extLst>
               <a:ext uri="{28A0092B-C50C-407E-A947-70E740481C1C}">
                 <a14:useLocalDpi xmlns:a14="http://schemas.microsoft.com/office/drawing/2010/main" val="0"/>
@@ -28281,7 +26640,7 @@
           <p:nvPr/>
         </p:nvPicPr>
         <p:blipFill>
-          <a:blip r:embed="rId3">
+          <a:blip r:embed="rId3" cstate="print">
             <a:extLst>
               <a:ext uri="{28A0092B-C50C-407E-A947-70E740481C1C}">
                 <a14:useLocalDpi xmlns:a14="http://schemas.microsoft.com/office/drawing/2010/main" val="0"/>
@@ -30923,7 +29282,7 @@
           <p:nvPr/>
         </p:nvPicPr>
         <p:blipFill>
-          <a:blip r:embed="rId14">
+          <a:blip r:embed="rId14" cstate="print">
             <a:extLst>
               <a:ext uri="{28A0092B-C50C-407E-A947-70E740481C1C}">
                 <a14:useLocalDpi xmlns:a14="http://schemas.microsoft.com/office/drawing/2010/main" val="0"/>
@@ -31571,7 +29930,7 @@
           <p:nvPr/>
         </p:nvPicPr>
         <p:blipFill>
-          <a:blip r:embed="rId2">
+          <a:blip r:embed="rId2" cstate="print">
             <a:extLst>
               <a:ext uri="{28A0092B-C50C-407E-A947-70E740481C1C}">
                 <a14:useLocalDpi xmlns:a14="http://schemas.microsoft.com/office/drawing/2010/main" val="0"/>
@@ -32054,7 +30413,7 @@
           <p:nvPr/>
         </p:nvPicPr>
         <p:blipFill>
-          <a:blip r:embed="rId2">
+          <a:blip r:embed="rId2" cstate="print">
             <a:extLst>
               <a:ext uri="{28A0092B-C50C-407E-A947-70E740481C1C}">
                 <a14:useLocalDpi xmlns:a14="http://schemas.microsoft.com/office/drawing/2010/main" val="0"/>

</xml_diff>